<commit_message>
added notes, speaker info
</commit_message>
<xml_diff>
--- a/MMS2019 - Configmgr and PowerShell the essentials.pptx
+++ b/MMS2019 - Configmgr and PowerShell the essentials.pptx
@@ -1921,6 +1921,32 @@
             <a:r>
               <a:rPr lang="en-US" dirty="0"/>
               <a:t> get removed once you start building your own tools around the product.</a:t>
+            </a:r>
+          </a:p>
+          <a:p>
+            <a:endParaRPr lang="en-US" dirty="0"/>
+          </a:p>
+          <a:p>
+            <a:r>
+              <a:rPr lang="en-US" b="1" dirty="0"/>
+              <a:t>MS is better than ever about support and extending CM, knowing how it works helps us to  know </a:t>
+            </a:r>
+            <a:r>
+              <a:rPr lang="en-US" b="1" dirty="0" err="1"/>
+              <a:t>whats</a:t>
+            </a:r>
+            <a:r>
+              <a:rPr lang="en-US" b="1" dirty="0"/>
+              <a:t> feasible, and to ask for help.</a:t>
+            </a:r>
+          </a:p>
+          <a:p>
+            <a:endParaRPr lang="en-US" b="1" dirty="0"/>
+          </a:p>
+          <a:p>
+            <a:r>
+              <a:rPr lang="en-US" b="0" dirty="0"/>
+              <a:t>And really, if we’re using CM, we will be more effective and love our jobs more if we know how to dig into CM with PowerShell and SQL</a:t>
             </a:r>
           </a:p>
         </p:txBody>
@@ -7449,47 +7475,45 @@
           <a:p>
             <a:r>
               <a:rPr lang="en-US" dirty="0"/>
-              <a:t>Greg </a:t>
-            </a:r>
-            <a:r>
-              <a:rPr lang="en-US" dirty="0">
-                <a:cs typeface="Segoe UI"/>
-              </a:rPr>
-              <a:t>Ramsey</a:t>
-            </a:r>
-            <a:endParaRPr lang="en-US" dirty="0"/>
-          </a:p>
-          <a:p>
-            <a:r>
-              <a:rPr lang="en-US" dirty="0">
-                <a:hlinkClick r:id="rId2"/>
-              </a:rPr>
-              <a:t>www.</a:t>
-            </a:r>
-            <a:r>
-              <a:rPr lang="en-US" dirty="0">
-                <a:cs typeface="Segoe UI"/>
-                <a:hlinkClick r:id="rId2"/>
-              </a:rPr>
-              <a:t>ramseyg.com</a:t>
-            </a:r>
-          </a:p>
-          <a:p>
-            <a:r>
-              <a:rPr lang="en-US" dirty="0">
-                <a:cs typeface="Segoe UI"/>
-              </a:rPr>
-              <a:t>Ramseyg@hotmail.com</a:t>
-            </a:r>
-          </a:p>
-          <a:p>
-            <a:r>
-              <a:rPr lang="en-US" dirty="0"/>
-              <a:t>Dell Technologies</a:t>
+              <a:t>Stephen Owen</a:t>
+            </a:r>
+          </a:p>
+          <a:p>
+            <a:r>
+              <a:rPr lang="en-US" dirty="0"/>
+              <a:t>FoxDeploy.com</a:t>
+            </a:r>
+          </a:p>
+          <a:p>
+            <a:r>
+              <a:rPr lang="en-US" dirty="0"/>
+              <a:t>@</a:t>
+            </a:r>
+            <a:r>
+              <a:rPr lang="en-US" dirty="0" err="1"/>
+              <a:t>FoxDeploy</a:t>
             </a:r>
             <a:endParaRPr lang="en-US" dirty="0">
-              <a:cs typeface="Segoe UI"/>
+              <a:hlinkClick r:id="rId2">
+                <a:extLst>
+                  <a:ext uri="{A12FA001-AC4F-418D-AE19-62706E023703}">
+                    <ahyp:hlinkClr xmlns:ahyp="http://schemas.microsoft.com/office/drawing/2018/hyperlinkcolor" val="tx"/>
+                  </a:ext>
+                </a:extLst>
+              </a:hlinkClick>
             </a:endParaRPr>
+          </a:p>
+          <a:p>
+            <a:r>
+              <a:rPr lang="en-US" dirty="0"/>
+              <a:t>Automation Engineer</a:t>
+            </a:r>
+          </a:p>
+          <a:p>
+            <a:r>
+              <a:rPr lang="en-US" dirty="0"/>
+              <a:t>Wells Fargo</a:t>
+            </a:r>
           </a:p>
         </p:txBody>
       </p:sp>
@@ -8105,6 +8129,53 @@
           </a:p>
         </p:txBody>
       </p:sp>
+      <p:sp>
+        <p:nvSpPr>
+          <p:cNvPr id="6" name="Rectangle 5">
+            <a:extLst>
+              <a:ext uri="{FF2B5EF4-FFF2-40B4-BE49-F238E27FC236}">
+                <a16:creationId xmlns:a16="http://schemas.microsoft.com/office/drawing/2014/main" id="{FA29C433-4550-4285-8D3D-561BE61F465F}"/>
+              </a:ext>
+            </a:extLst>
+          </p:cNvPr>
+          <p:cNvSpPr/>
+          <p:nvPr/>
+        </p:nvSpPr>
+        <p:spPr>
+          <a:xfrm>
+            <a:off x="7342207" y="6202000"/>
+            <a:ext cx="4626016" cy="369332"/>
+          </a:xfrm>
+          <a:prstGeom prst="rect">
+            <a:avLst/>
+          </a:prstGeom>
+        </p:spPr>
+        <p:txBody>
+          <a:bodyPr wrap="square">
+            <a:spAutoFit/>
+          </a:bodyPr>
+          <a:lstStyle/>
+          <a:p>
+            <a:r>
+              <a:rPr lang="en-US" dirty="0"/>
+              <a:t>@</a:t>
+            </a:r>
+            <a:r>
+              <a:rPr lang="en-US" dirty="0" err="1"/>
+              <a:t>FredBainbridge</a:t>
+            </a:r>
+            <a:r>
+              <a:rPr lang="en-US" dirty="0"/>
+              <a:t> @</a:t>
+            </a:r>
+            <a:r>
+              <a:rPr lang="en-US" dirty="0" err="1"/>
+              <a:t>FoxDeploy</a:t>
+            </a:r>
+            <a:endParaRPr lang="en-US" dirty="0"/>
+          </a:p>
+        </p:txBody>
+      </p:sp>
     </p:spTree>
     <p:extLst>
       <p:ext uri="{BB962C8B-B14F-4D97-AF65-F5344CB8AC3E}">
@@ -8740,9 +8811,9 @@
               <a:rPr lang="en-US" dirty="0" err="1">
                 <a:cs typeface="Segoe UI"/>
               </a:rPr>
-              <a:t>ramseyg</a:t>
-            </a:r>
-            <a:endParaRPr lang="en-US" dirty="0" err="1"/>
+              <a:t>FoxDeploy</a:t>
+            </a:r>
+            <a:endParaRPr lang="en-US" dirty="0"/>
           </a:p>
         </p:txBody>
       </p:sp>
@@ -8815,7 +8886,7 @@
               <a:rPr lang="en-US" dirty="0">
                 <a:cs typeface="Segoe UI"/>
               </a:rPr>
-              <a:t>BBQ, Drinking Fred's Beer</a:t>
+              <a:t>Game of Thrones, games</a:t>
             </a:r>
             <a:endParaRPr lang="en-US" dirty="0"/>
           </a:p>
@@ -8931,7 +9002,7 @@
           <a:p>
             <a:r>
               <a:rPr lang="en-US" dirty="0"/>
-              <a:t>Greg Ramsey</a:t>
+              <a:t>Stephen Owen</a:t>
             </a:r>
           </a:p>
         </p:txBody>
@@ -9029,6 +9100,53 @@
           </a:p>
         </p:txBody>
       </p:sp>
+      <p:sp>
+        <p:nvSpPr>
+          <p:cNvPr id="2" name="Rectangle 1">
+            <a:extLst>
+              <a:ext uri="{FF2B5EF4-FFF2-40B4-BE49-F238E27FC236}">
+                <a16:creationId xmlns:a16="http://schemas.microsoft.com/office/drawing/2014/main" id="{CFE64CF9-23DD-476B-98B7-4DE64871730A}"/>
+              </a:ext>
+            </a:extLst>
+          </p:cNvPr>
+          <p:cNvSpPr/>
+          <p:nvPr/>
+        </p:nvSpPr>
+        <p:spPr>
+          <a:xfrm>
+            <a:off x="7342207" y="6202000"/>
+            <a:ext cx="4626016" cy="369332"/>
+          </a:xfrm>
+          <a:prstGeom prst="rect">
+            <a:avLst/>
+          </a:prstGeom>
+        </p:spPr>
+        <p:txBody>
+          <a:bodyPr wrap="square">
+            <a:spAutoFit/>
+          </a:bodyPr>
+          <a:lstStyle/>
+          <a:p>
+            <a:r>
+              <a:rPr lang="en-US" dirty="0"/>
+              <a:t>@</a:t>
+            </a:r>
+            <a:r>
+              <a:rPr lang="en-US" dirty="0" err="1"/>
+              <a:t>FredBainbridge</a:t>
+            </a:r>
+            <a:r>
+              <a:rPr lang="en-US" dirty="0"/>
+              <a:t> @</a:t>
+            </a:r>
+            <a:r>
+              <a:rPr lang="en-US" dirty="0" err="1"/>
+              <a:t>FoxDeploy</a:t>
+            </a:r>
+            <a:endParaRPr lang="en-US" dirty="0"/>
+          </a:p>
+        </p:txBody>
+      </p:sp>
     </p:spTree>
     <p:extLst>
       <p:ext uri="{BB962C8B-B14F-4D97-AF65-F5344CB8AC3E}">
@@ -9457,6 +9575,60 @@
           <a:chExt cx="0" cy="0"/>
         </a:xfrm>
       </p:grpSpPr>
+      <p:sp>
+        <p:nvSpPr>
+          <p:cNvPr id="2" name="TextBox 1">
+            <a:extLst>
+              <a:ext uri="{FF2B5EF4-FFF2-40B4-BE49-F238E27FC236}">
+                <a16:creationId xmlns:a16="http://schemas.microsoft.com/office/drawing/2014/main" id="{1F8DB9B8-F7DC-4EB8-82A5-C88758ECB4FD}"/>
+              </a:ext>
+            </a:extLst>
+          </p:cNvPr>
+          <p:cNvSpPr txBox="1"/>
+          <p:nvPr/>
+        </p:nvSpPr>
+        <p:spPr>
+          <a:xfrm>
+            <a:off x="6435524" y="1053296"/>
+            <a:ext cx="5532699" cy="1384995"/>
+          </a:xfrm>
+          <a:prstGeom prst="rect">
+            <a:avLst/>
+          </a:prstGeom>
+          <a:noFill/>
+        </p:spPr>
+        <p:txBody>
+          <a:bodyPr wrap="square" rtlCol="0">
+            <a:spAutoFit/>
+          </a:bodyPr>
+          <a:lstStyle/>
+          <a:p>
+            <a:r>
+              <a:rPr lang="en-US" sz="2800" dirty="0"/>
+              <a:t>Fred Bainbridge @</a:t>
+            </a:r>
+            <a:r>
+              <a:rPr lang="en-US" sz="2800" dirty="0" err="1"/>
+              <a:t>FredBainbridge</a:t>
+            </a:r>
+            <a:endParaRPr lang="en-US" sz="2800" dirty="0"/>
+          </a:p>
+          <a:p>
+            <a:endParaRPr lang="en-US" sz="2800" dirty="0"/>
+          </a:p>
+          <a:p>
+            <a:r>
+              <a:rPr lang="en-US" sz="2800" dirty="0"/>
+              <a:t>Stephen Owen   @</a:t>
+            </a:r>
+            <a:r>
+              <a:rPr lang="en-US" sz="2800" dirty="0" err="1"/>
+              <a:t>FoxDeploy</a:t>
+            </a:r>
+            <a:endParaRPr lang="en-US" sz="2800" dirty="0"/>
+          </a:p>
+        </p:txBody>
+      </p:sp>
     </p:spTree>
     <p:extLst>
       <p:ext uri="{BB962C8B-B14F-4D97-AF65-F5344CB8AC3E}">
@@ -10134,6 +10306,53 @@
             <a:endParaRPr lang="en-US" dirty="0"/>
           </a:p>
           <a:p>
+            <a:endParaRPr lang="en-US" dirty="0"/>
+          </a:p>
+        </p:txBody>
+      </p:sp>
+      <p:sp>
+        <p:nvSpPr>
+          <p:cNvPr id="6" name="Rectangle 5">
+            <a:extLst>
+              <a:ext uri="{FF2B5EF4-FFF2-40B4-BE49-F238E27FC236}">
+                <a16:creationId xmlns:a16="http://schemas.microsoft.com/office/drawing/2014/main" id="{2A83898E-DF13-4027-9676-3892588C5DBA}"/>
+              </a:ext>
+            </a:extLst>
+          </p:cNvPr>
+          <p:cNvSpPr/>
+          <p:nvPr/>
+        </p:nvSpPr>
+        <p:spPr>
+          <a:xfrm>
+            <a:off x="7342207" y="6202000"/>
+            <a:ext cx="4626016" cy="369332"/>
+          </a:xfrm>
+          <a:prstGeom prst="rect">
+            <a:avLst/>
+          </a:prstGeom>
+        </p:spPr>
+        <p:txBody>
+          <a:bodyPr wrap="square">
+            <a:spAutoFit/>
+          </a:bodyPr>
+          <a:lstStyle/>
+          <a:p>
+            <a:r>
+              <a:rPr lang="en-US" dirty="0"/>
+              <a:t>@</a:t>
+            </a:r>
+            <a:r>
+              <a:rPr lang="en-US" dirty="0" err="1"/>
+              <a:t>FredBainbridge</a:t>
+            </a:r>
+            <a:r>
+              <a:rPr lang="en-US" dirty="0"/>
+              <a:t> @</a:t>
+            </a:r>
+            <a:r>
+              <a:rPr lang="en-US" dirty="0" err="1"/>
+              <a:t>FoxDeploy</a:t>
+            </a:r>
             <a:endParaRPr lang="en-US" dirty="0"/>
           </a:p>
         </p:txBody>
@@ -18930,6 +19149,15 @@
             </a:r>
           </a:p>
           <a:p>
+            <a:pPr marL="457200" lvl="1" indent="0">
+              <a:buNone/>
+            </a:pPr>
+            <a:br>
+              <a:rPr lang="en-US" dirty="0"/>
+            </a:br>
+            <a:endParaRPr lang="en-US" dirty="0"/>
+          </a:p>
+          <a:p>
             <a:endParaRPr lang="en-US" dirty="0"/>
           </a:p>
           <a:p>
@@ -19010,6 +19238,53 @@
             <a:endParaRPr lang="en-US" dirty="0"/>
           </a:p>
           <a:p>
+            <a:endParaRPr lang="en-US" dirty="0"/>
+          </a:p>
+        </p:txBody>
+      </p:sp>
+      <p:sp>
+        <p:nvSpPr>
+          <p:cNvPr id="6" name="Rectangle 5">
+            <a:extLst>
+              <a:ext uri="{FF2B5EF4-FFF2-40B4-BE49-F238E27FC236}">
+                <a16:creationId xmlns:a16="http://schemas.microsoft.com/office/drawing/2014/main" id="{96AE58A7-F12E-46AF-8EAB-6E2CE212704F}"/>
+              </a:ext>
+            </a:extLst>
+          </p:cNvPr>
+          <p:cNvSpPr/>
+          <p:nvPr/>
+        </p:nvSpPr>
+        <p:spPr>
+          <a:xfrm>
+            <a:off x="7342207" y="6202000"/>
+            <a:ext cx="4626016" cy="369332"/>
+          </a:xfrm>
+          <a:prstGeom prst="rect">
+            <a:avLst/>
+          </a:prstGeom>
+        </p:spPr>
+        <p:txBody>
+          <a:bodyPr wrap="square">
+            <a:spAutoFit/>
+          </a:bodyPr>
+          <a:lstStyle/>
+          <a:p>
+            <a:r>
+              <a:rPr lang="en-US" dirty="0"/>
+              <a:t>@</a:t>
+            </a:r>
+            <a:r>
+              <a:rPr lang="en-US" dirty="0" err="1"/>
+              <a:t>FredBainbridge</a:t>
+            </a:r>
+            <a:r>
+              <a:rPr lang="en-US" dirty="0"/>
+              <a:t> @</a:t>
+            </a:r>
+            <a:r>
+              <a:rPr lang="en-US" dirty="0" err="1"/>
+              <a:t>FoxDeploy</a:t>
+            </a:r>
             <a:endParaRPr lang="en-US" dirty="0"/>
           </a:p>
         </p:txBody>
@@ -19537,15 +19812,6 @@
 </file>
 
 <file path=customXml/item1.xml><?xml version="1.0" encoding="utf-8"?>
-<?mso-contentType ?>
-<FormTemplates xmlns="http://schemas.microsoft.com/sharepoint/v3/contenttype/forms">
-  <Display>DocumentLibraryForm</Display>
-  <Edit>DocumentLibraryForm</Edit>
-  <New>DocumentLibraryForm</New>
-</FormTemplates>
-</file>
-
-<file path=customXml/item2.xml><?xml version="1.0" encoding="utf-8"?>
 <ct:contentTypeSchema xmlns:ct="http://schemas.microsoft.com/office/2006/metadata/contentType" xmlns:ma="http://schemas.microsoft.com/office/2006/metadata/properties/metaAttributes" ct:_="" ma:_="" ma:contentTypeName="Document" ma:contentTypeID="0x010100CFD7474EC5F9804A8C0915A0D2B3E72B" ma:contentTypeVersion="6" ma:contentTypeDescription="Create a new document." ma:contentTypeScope="" ma:versionID="1e506071d132a47b68c5589909b09f0e">
   <xsd:schema xmlns:xsd="http://www.w3.org/2001/XMLSchema" xmlns:xs="http://www.w3.org/2001/XMLSchema" xmlns:p="http://schemas.microsoft.com/office/2006/metadata/properties" xmlns:ns2="437d3976-146d-487e-9b32-45ade7cdb3c3" xmlns:ns3="ba924082-f255-4689-bc14-7c311a17681c" targetNamespace="http://schemas.microsoft.com/office/2006/metadata/properties" ma:root="true" ma:fieldsID="d9451a99ae5dfcf301f63b02ef9f83d5" ns2:_="" ns3:_="">
     <xsd:import namespace="437d3976-146d-487e-9b32-45ade7cdb3c3"/>
@@ -19724,6 +19990,15 @@
 </ct:contentTypeSchema>
 </file>
 
+<file path=customXml/item2.xml><?xml version="1.0" encoding="utf-8"?>
+<?mso-contentType ?>
+<FormTemplates xmlns="http://schemas.microsoft.com/sharepoint/v3/contenttype/forms">
+  <Display>DocumentLibraryForm</Display>
+  <Edit>DocumentLibraryForm</Edit>
+  <New>DocumentLibraryForm</New>
+</FormTemplates>
+</file>
+
 <file path=customXml/item3.xml><?xml version="1.0" encoding="utf-8"?>
 <p:properties xmlns:p="http://schemas.microsoft.com/office/2006/metadata/properties" xmlns:xsi="http://www.w3.org/2001/XMLSchema-instance" xmlns:pc="http://schemas.microsoft.com/office/infopath/2007/PartnerControls">
   <documentManagement/>
@@ -19731,14 +20006,6 @@
 </file>
 
 <file path=customXml/itemProps1.xml><?xml version="1.0" encoding="utf-8"?>
-<ds:datastoreItem xmlns:ds="http://schemas.openxmlformats.org/officeDocument/2006/customXml" ds:itemID="{8F9099B0-B9E3-45A6-848D-7EA25626C078}">
-  <ds:schemaRefs>
-    <ds:schemaRef ds:uri="http://schemas.microsoft.com/sharepoint/v3/contenttype/forms"/>
-  </ds:schemaRefs>
-</ds:datastoreItem>
-</file>
-
-<file path=customXml/itemProps2.xml><?xml version="1.0" encoding="utf-8"?>
 <ds:datastoreItem xmlns:ds="http://schemas.openxmlformats.org/officeDocument/2006/customXml" ds:itemID="{1881FD18-C877-47D9-A9C8-9B9EB7A5D424}">
   <ds:schemaRefs>
     <ds:schemaRef ds:uri="http://schemas.microsoft.com/office/2006/metadata/contentType"/>
@@ -19753,6 +20020,14 @@
     <ds:schemaRef ds:uri="http://purl.org/dc/elements/1.1/"/>
     <ds:schemaRef ds:uri="http://purl.org/dc/terms/"/>
     <ds:schemaRef ds:uri="http://schemas.microsoft.com/internal/obd"/>
+  </ds:schemaRefs>
+</ds:datastoreItem>
+</file>
+
+<file path=customXml/itemProps2.xml><?xml version="1.0" encoding="utf-8"?>
+<ds:datastoreItem xmlns:ds="http://schemas.openxmlformats.org/officeDocument/2006/customXml" ds:itemID="{8F9099B0-B9E3-45A6-848D-7EA25626C078}">
+  <ds:schemaRefs>
+    <ds:schemaRef ds:uri="http://schemas.microsoft.com/sharepoint/v3/contenttype/forms"/>
   </ds:schemaRefs>
 </ds:datastoreItem>
 </file>

</xml_diff>